<commit_message>
Final Commit for presentation and code
</commit_message>
<xml_diff>
--- a/Multi-level Monte Carlo.pptx
+++ b/Multi-level Monte Carlo.pptx
@@ -53,8 +53,8 @@
     <p:sldId id="305" r:id="rId44"/>
     <p:sldId id="306" r:id="rId45"/>
     <p:sldId id="307" r:id="rId46"/>
-    <p:sldId id="273" r:id="rId47"/>
-    <p:sldId id="279" r:id="rId48"/>
+    <p:sldId id="308" r:id="rId47"/>
+    <p:sldId id="273" r:id="rId48"/>
     <p:sldId id="278" r:id="rId49"/>
     <p:sldId id="277" r:id="rId50"/>
     <p:sldId id="274" r:id="rId51"/>
@@ -247,7 +247,7 @@
           <a:p>
             <a:fld id="{7C50E55A-97EB-4F80-A849-C41770BD2C14}" type="datetimeFigureOut">
               <a:rPr lang="de-DE" smtClean="0"/>
-              <a:t>12.11.2022</a:t>
+              <a:t>13.11.2022</a:t>
             </a:fld>
             <a:endParaRPr lang="de-DE"/>
           </a:p>
@@ -664,7 +664,7 @@
           <a:p>
             <a:fld id="{42DC160E-E8F3-4A7B-B560-3F7DDCB8DCCB}" type="datetime1">
               <a:rPr lang="de-DE" smtClean="0"/>
-              <a:t>12.11.2022</a:t>
+              <a:t>13.11.2022</a:t>
             </a:fld>
             <a:endParaRPr lang="de-DE"/>
           </a:p>
@@ -867,7 +867,7 @@
           <a:p>
             <a:fld id="{4A6BE53A-91CE-4980-AA36-90EC57DDF9C5}" type="datetime1">
               <a:rPr lang="de-DE" smtClean="0"/>
-              <a:t>12.11.2022</a:t>
+              <a:t>13.11.2022</a:t>
             </a:fld>
             <a:endParaRPr lang="de-DE"/>
           </a:p>
@@ -1080,7 +1080,7 @@
           <a:p>
             <a:fld id="{17CFFA08-DAA5-4F18-B5D1-AB31B1B0E859}" type="datetime1">
               <a:rPr lang="de-DE" smtClean="0"/>
-              <a:t>12.11.2022</a:t>
+              <a:t>13.11.2022</a:t>
             </a:fld>
             <a:endParaRPr lang="de-DE"/>
           </a:p>
@@ -1283,7 +1283,7 @@
           <a:p>
             <a:fld id="{F71301FD-471F-47BA-8255-218BED4D95B7}" type="datetime1">
               <a:rPr lang="de-DE" smtClean="0"/>
-              <a:t>12.11.2022</a:t>
+              <a:t>13.11.2022</a:t>
             </a:fld>
             <a:endParaRPr lang="de-DE"/>
           </a:p>
@@ -1562,7 +1562,7 @@
           <a:p>
             <a:fld id="{C392B4E1-5916-4497-8B8B-D395964DE0B1}" type="datetime1">
               <a:rPr lang="de-DE" smtClean="0"/>
-              <a:t>12.11.2022</a:t>
+              <a:t>13.11.2022</a:t>
             </a:fld>
             <a:endParaRPr lang="de-DE"/>
           </a:p>
@@ -1833,7 +1833,7 @@
           <a:p>
             <a:fld id="{1067EDDB-7321-4FC9-8F82-4E0F031BCDC8}" type="datetime1">
               <a:rPr lang="de-DE" smtClean="0"/>
-              <a:t>12.11.2022</a:t>
+              <a:t>13.11.2022</a:t>
             </a:fld>
             <a:endParaRPr lang="de-DE"/>
           </a:p>
@@ -2251,7 +2251,7 @@
           <a:p>
             <a:fld id="{5F043441-D25A-4199-BAEE-7813CFDA2B80}" type="datetime1">
               <a:rPr lang="de-DE" smtClean="0"/>
-              <a:t>12.11.2022</a:t>
+              <a:t>13.11.2022</a:t>
             </a:fld>
             <a:endParaRPr lang="de-DE"/>
           </a:p>
@@ -2396,7 +2396,7 @@
           <a:p>
             <a:fld id="{12EB2EA3-B2BF-44E2-98FF-4120D71A9154}" type="datetime1">
               <a:rPr lang="de-DE" smtClean="0"/>
-              <a:t>12.11.2022</a:t>
+              <a:t>13.11.2022</a:t>
             </a:fld>
             <a:endParaRPr lang="de-DE"/>
           </a:p>
@@ -2512,7 +2512,7 @@
           <a:p>
             <a:fld id="{DC0C6797-1792-4813-81C9-F4233BFC3146}" type="datetime1">
               <a:rPr lang="de-DE" smtClean="0"/>
-              <a:t>12.11.2022</a:t>
+              <a:t>13.11.2022</a:t>
             </a:fld>
             <a:endParaRPr lang="de-DE"/>
           </a:p>
@@ -2828,7 +2828,7 @@
           <a:p>
             <a:fld id="{657F5487-6AAE-4510-BFE1-E06DD81B194F}" type="datetime1">
               <a:rPr lang="de-DE" smtClean="0"/>
-              <a:t>12.11.2022</a:t>
+              <a:t>13.11.2022</a:t>
             </a:fld>
             <a:endParaRPr lang="de-DE"/>
           </a:p>
@@ -3120,7 +3120,7 @@
           <a:p>
             <a:fld id="{EF7B6145-38F1-44E8-8BB0-2692C88871BC}" type="datetime1">
               <a:rPr lang="de-DE" smtClean="0"/>
-              <a:t>12.11.2022</a:t>
+              <a:t>13.11.2022</a:t>
             </a:fld>
             <a:endParaRPr lang="de-DE"/>
           </a:p>
@@ -3366,7 +3366,7 @@
           <a:p>
             <a:fld id="{75555391-0F19-4A9B-852A-374D38A6EE36}" type="datetime1">
               <a:rPr lang="de-DE" smtClean="0"/>
-              <a:t>12.11.2022</a:t>
+              <a:t>13.11.2022</a:t>
             </a:fld>
             <a:endParaRPr lang="de-DE"/>
           </a:p>
@@ -25622,42 +25622,6 @@
           </a:fontRef>
         </p:style>
       </p:cxnSp>
-      <p:cxnSp>
-        <p:nvCxnSpPr>
-          <p:cNvPr id="11" name="Straight Connector 10">
-            <a:extLst>
-              <a:ext uri="{FF2B5EF4-FFF2-40B4-BE49-F238E27FC236}">
-                <a16:creationId xmlns:a16="http://schemas.microsoft.com/office/drawing/2014/main" id="{AF920692-B7E7-2BE6-CF6A-3C184A647828}"/>
-              </a:ext>
-            </a:extLst>
-          </p:cNvPr>
-          <p:cNvCxnSpPr/>
-          <p:nvPr/>
-        </p:nvCxnSpPr>
-        <p:spPr>
-          <a:xfrm>
-            <a:off x="111967" y="901053"/>
-            <a:ext cx="11980506" cy="0"/>
-          </a:xfrm>
-          <a:prstGeom prst="line">
-            <a:avLst/>
-          </a:prstGeom>
-        </p:spPr>
-        <p:style>
-          <a:lnRef idx="3">
-            <a:schemeClr val="dk1"/>
-          </a:lnRef>
-          <a:fillRef idx="0">
-            <a:schemeClr val="dk1"/>
-          </a:fillRef>
-          <a:effectRef idx="2">
-            <a:schemeClr val="dk1"/>
-          </a:effectRef>
-          <a:fontRef idx="minor">
-            <a:schemeClr val="tx1"/>
-          </a:fontRef>
-        </p:style>
-      </p:cxnSp>
       <p:sp>
         <p:nvSpPr>
           <p:cNvPr id="3" name="Content Placeholder 2">
@@ -26058,92 +26022,144 @@
               <a:buFont typeface="Arial" panose="020B0604020202020204" pitchFamily="34" charset="0"/>
               <a:buNone/>
             </a:pPr>
-            <a:r>
-              <a:rPr lang="en-US" sz="2400" dirty="0"/>
-              <a:t>As more examples of the flexibility of the MLMC approach, the levels can correspond to different levels of computing precision</a:t>
-            </a:r>
-          </a:p>
-          <a:p>
-            <a:pPr>
-              <a:lnSpc>
-                <a:spcPct val="120000"/>
-              </a:lnSpc>
-            </a:pPr>
-            <a:r>
-              <a:rPr lang="en-US" sz="2400" dirty="0"/>
-              <a:t>2ℓ+2 bits of precision on level ℓ when using FPGAs (Korn, </a:t>
-            </a:r>
-            <a:r>
-              <a:rPr lang="en-US" sz="2400" dirty="0" err="1"/>
-              <a:t>Ritter,Wehn</a:t>
-            </a:r>
-            <a:r>
-              <a:rPr lang="en-US" sz="2400" dirty="0"/>
-              <a:t>, 2014)</a:t>
-            </a:r>
-          </a:p>
-          <a:p>
-            <a:pPr>
-              <a:lnSpc>
-                <a:spcPct val="120000"/>
-              </a:lnSpc>
-            </a:pPr>
-            <a:r>
-              <a:rPr lang="en-US" sz="2400" dirty="0"/>
-              <a:t>IEEE half-precision on level 0, IEEE single precision on level1, etc., when computing on CPUs or GPUs</a:t>
-            </a:r>
-          </a:p>
-          <a:p>
-            <a:pPr marL="0" indent="0">
-              <a:lnSpc>
-                <a:spcPct val="120000"/>
-              </a:lnSpc>
-              <a:buFont typeface="Arial" panose="020B0604020202020204" pitchFamily="34" charset="0"/>
-              <a:buNone/>
-            </a:pPr>
-            <a:r>
-              <a:rPr lang="en-US" sz="2400" dirty="0"/>
-              <a:t>or the different levels can use different random number generators</a:t>
-            </a:r>
-          </a:p>
-          <a:p>
-            <a:pPr>
-              <a:lnSpc>
-                <a:spcPct val="120000"/>
-              </a:lnSpc>
-            </a:pPr>
-            <a:r>
-              <a:rPr lang="en-US" sz="2400" dirty="0"/>
-              <a:t>level 0: 10-bit uniform random numbers, with table lookup to convert to approximate </a:t>
-            </a:r>
-            <a:r>
-              <a:rPr lang="en-US" sz="2400" dirty="0" err="1"/>
-              <a:t>Normals</a:t>
-            </a:r>
-            <a:endParaRPr lang="en-US" sz="2400" dirty="0"/>
-          </a:p>
-          <a:p>
-            <a:pPr>
-              <a:lnSpc>
-                <a:spcPct val="120000"/>
-              </a:lnSpc>
-            </a:pPr>
-            <a:r>
-              <a:rPr lang="en-US" sz="2400" dirty="0"/>
-              <a:t>level 1: 32-bit uniform random numbers, and more complex calculation to obtain </a:t>
-            </a:r>
-            <a:r>
-              <a:rPr lang="en-US" sz="2400" dirty="0" err="1"/>
-              <a:t>Normals</a:t>
-            </a:r>
             <a:endParaRPr lang="de-DE" sz="2400" dirty="0"/>
           </a:p>
         </p:txBody>
       </p:sp>
+      <p:pic>
+        <p:nvPicPr>
+          <p:cNvPr id="1026" name="Picture 2">
+            <a:extLst>
+              <a:ext uri="{FF2B5EF4-FFF2-40B4-BE49-F238E27FC236}">
+                <a16:creationId xmlns:a16="http://schemas.microsoft.com/office/drawing/2014/main" id="{FC9A29BA-A7DC-B387-EA42-7AAED930B800}"/>
+              </a:ext>
+            </a:extLst>
+          </p:cNvPr>
+          <p:cNvPicPr>
+            <a:picLocks noChangeAspect="1" noChangeArrowheads="1"/>
+          </p:cNvPicPr>
+          <p:nvPr/>
+        </p:nvPicPr>
+        <p:blipFill>
+          <a:blip r:embed="rId2">
+            <a:extLst>
+              <a:ext uri="{28A0092B-C50C-407E-A947-70E740481C1C}">
+                <a14:useLocalDpi xmlns:a14="http://schemas.microsoft.com/office/drawing/2010/main" val="0"/>
+              </a:ext>
+            </a:extLst>
+          </a:blip>
+          <a:srcRect/>
+          <a:stretch>
+            <a:fillRect/>
+          </a:stretch>
+        </p:blipFill>
+        <p:spPr bwMode="auto">
+          <a:xfrm>
+            <a:off x="3057524" y="817830"/>
+            <a:ext cx="6076950" cy="4562475"/>
+          </a:xfrm>
+          <a:prstGeom prst="rect">
+            <a:avLst/>
+          </a:prstGeom>
+          <a:noFill/>
+          <a:extLst>
+            <a:ext uri="{909E8E84-426E-40DD-AFC4-6F175D3DCCD1}">
+              <a14:hiddenFill xmlns:a14="http://schemas.microsoft.com/office/drawing/2010/main">
+                <a:solidFill>
+                  <a:srgbClr val="FFFFFF"/>
+                </a:solidFill>
+              </a14:hiddenFill>
+            </a:ext>
+          </a:extLst>
+        </p:spPr>
+      </p:pic>
+      <p:pic>
+        <p:nvPicPr>
+          <p:cNvPr id="1028" name="Picture 4">
+            <a:extLst>
+              <a:ext uri="{FF2B5EF4-FFF2-40B4-BE49-F238E27FC236}">
+                <a16:creationId xmlns:a16="http://schemas.microsoft.com/office/drawing/2014/main" id="{80B18196-0957-63FF-03CE-C8A810A5A6A2}"/>
+              </a:ext>
+            </a:extLst>
+          </p:cNvPr>
+          <p:cNvPicPr>
+            <a:picLocks noChangeAspect="1" noChangeArrowheads="1"/>
+          </p:cNvPicPr>
+          <p:nvPr/>
+        </p:nvPicPr>
+        <p:blipFill>
+          <a:blip r:embed="rId3">
+            <a:extLst>
+              <a:ext uri="{28A0092B-C50C-407E-A947-70E740481C1C}">
+                <a14:useLocalDpi xmlns:a14="http://schemas.microsoft.com/office/drawing/2010/main" val="0"/>
+              </a:ext>
+            </a:extLst>
+          </a:blip>
+          <a:srcRect/>
+          <a:stretch>
+            <a:fillRect/>
+          </a:stretch>
+        </p:blipFill>
+        <p:spPr bwMode="auto">
+          <a:xfrm>
+            <a:off x="2538412" y="5125124"/>
+            <a:ext cx="7115175" cy="1171575"/>
+          </a:xfrm>
+          <a:prstGeom prst="rect">
+            <a:avLst/>
+          </a:prstGeom>
+          <a:noFill/>
+          <a:extLst>
+            <a:ext uri="{909E8E84-426E-40DD-AFC4-6F175D3DCCD1}">
+              <a14:hiddenFill xmlns:a14="http://schemas.microsoft.com/office/drawing/2010/main">
+                <a:solidFill>
+                  <a:srgbClr val="FFFFFF"/>
+                </a:solidFill>
+              </a14:hiddenFill>
+            </a:ext>
+          </a:extLst>
+        </p:spPr>
+      </p:pic>
+      <p:cxnSp>
+        <p:nvCxnSpPr>
+          <p:cNvPr id="11" name="Straight Connector 10">
+            <a:extLst>
+              <a:ext uri="{FF2B5EF4-FFF2-40B4-BE49-F238E27FC236}">
+                <a16:creationId xmlns:a16="http://schemas.microsoft.com/office/drawing/2014/main" id="{AF920692-B7E7-2BE6-CF6A-3C184A647828}"/>
+              </a:ext>
+            </a:extLst>
+          </p:cNvPr>
+          <p:cNvCxnSpPr/>
+          <p:nvPr/>
+        </p:nvCxnSpPr>
+        <p:spPr>
+          <a:xfrm>
+            <a:off x="111967" y="901053"/>
+            <a:ext cx="11980506" cy="0"/>
+          </a:xfrm>
+          <a:prstGeom prst="line">
+            <a:avLst/>
+          </a:prstGeom>
+        </p:spPr>
+        <p:style>
+          <a:lnRef idx="3">
+            <a:schemeClr val="dk1"/>
+          </a:lnRef>
+          <a:fillRef idx="0">
+            <a:schemeClr val="dk1"/>
+          </a:fillRef>
+          <a:effectRef idx="2">
+            <a:schemeClr val="dk1"/>
+          </a:effectRef>
+          <a:fontRef idx="minor">
+            <a:schemeClr val="tx1"/>
+          </a:fontRef>
+        </p:style>
+      </p:cxnSp>
     </p:spTree>
     <p:extLst>
       <p:ext uri="{BB962C8B-B14F-4D97-AF65-F5344CB8AC3E}">
-        <p14:creationId xmlns:p14="http://schemas.microsoft.com/office/powerpoint/2010/main" val="1468382734"/>
+        <p14:creationId xmlns:p14="http://schemas.microsoft.com/office/powerpoint/2010/main" val="3025172791"/>
       </p:ext>
     </p:extLst>
   </p:cSld>
@@ -26215,7 +26231,7 @@
                   </a:schemeClr>
                 </a:solidFill>
               </a:rPr>
-              <a:t>Random Diffusion Problem</a:t>
+              <a:t>Mixed precision computing</a:t>
             </a:r>
             <a:endParaRPr lang="de-DE" sz="4000" dirty="0">
               <a:solidFill>
@@ -26756,44 +26772,92 @@
               <a:buFont typeface="Arial" panose="020B0604020202020204" pitchFamily="34" charset="0"/>
               <a:buNone/>
             </a:pPr>
+            <a:r>
+              <a:rPr lang="en-US" sz="2400" dirty="0"/>
+              <a:t>As more examples of the flexibility of the MLMC approach, the levels can correspond to different levels of computing precision</a:t>
+            </a:r>
+          </a:p>
+          <a:p>
+            <a:pPr>
+              <a:lnSpc>
+                <a:spcPct val="120000"/>
+              </a:lnSpc>
+            </a:pPr>
+            <a:r>
+              <a:rPr lang="en-US" sz="2400" dirty="0"/>
+              <a:t>2ℓ+2 bits of precision on level ℓ when using FPGAs (Korn, Ritter, </a:t>
+            </a:r>
+            <a:r>
+              <a:rPr lang="en-US" sz="2400" dirty="0" err="1"/>
+              <a:t>Wehn</a:t>
+            </a:r>
+            <a:r>
+              <a:rPr lang="en-US" sz="2400" dirty="0"/>
+              <a:t>, 2014)</a:t>
+            </a:r>
+          </a:p>
+          <a:p>
+            <a:pPr>
+              <a:lnSpc>
+                <a:spcPct val="120000"/>
+              </a:lnSpc>
+            </a:pPr>
+            <a:r>
+              <a:rPr lang="en-US" sz="2400" dirty="0"/>
+              <a:t>IEEE half-precision on level 0, IEEE single precision on level1, etc., when computing on CPUs or GPUs</a:t>
+            </a:r>
+          </a:p>
+          <a:p>
+            <a:pPr marL="0" indent="0">
+              <a:lnSpc>
+                <a:spcPct val="120000"/>
+              </a:lnSpc>
+              <a:buFont typeface="Arial" panose="020B0604020202020204" pitchFamily="34" charset="0"/>
+              <a:buNone/>
+            </a:pPr>
+            <a:r>
+              <a:rPr lang="en-US" sz="2400" dirty="0"/>
+              <a:t>or the different levels can use different random number generators</a:t>
+            </a:r>
+          </a:p>
+          <a:p>
+            <a:pPr>
+              <a:lnSpc>
+                <a:spcPct val="120000"/>
+              </a:lnSpc>
+            </a:pPr>
+            <a:r>
+              <a:rPr lang="en-US" sz="2400" dirty="0"/>
+              <a:t>level 0: 10-bit uniform random numbers, with table lookup to convert to approximate </a:t>
+            </a:r>
+            <a:r>
+              <a:rPr lang="en-US" sz="2400" dirty="0" err="1"/>
+              <a:t>Normals</a:t>
+            </a:r>
+            <a:endParaRPr lang="en-US" sz="2400" dirty="0"/>
+          </a:p>
+          <a:p>
+            <a:pPr>
+              <a:lnSpc>
+                <a:spcPct val="120000"/>
+              </a:lnSpc>
+            </a:pPr>
+            <a:r>
+              <a:rPr lang="en-US" sz="2400" dirty="0"/>
+              <a:t>level 1: 32-bit uniform random numbers, and more complex calculation to obtain </a:t>
+            </a:r>
+            <a:r>
+              <a:rPr lang="en-US" sz="2400" dirty="0" err="1"/>
+              <a:t>Normals</a:t>
+            </a:r>
             <a:endParaRPr lang="de-DE" sz="2400" dirty="0"/>
           </a:p>
         </p:txBody>
       </p:sp>
-      <p:pic>
-        <p:nvPicPr>
-          <p:cNvPr id="7" name="Picture 6">
-            <a:extLst>
-              <a:ext uri="{FF2B5EF4-FFF2-40B4-BE49-F238E27FC236}">
-                <a16:creationId xmlns:a16="http://schemas.microsoft.com/office/drawing/2014/main" id="{D89A6879-08ED-40E8-081B-B97D5215EB34}"/>
-              </a:ext>
-            </a:extLst>
-          </p:cNvPr>
-          <p:cNvPicPr>
-            <a:picLocks noChangeAspect="1"/>
-          </p:cNvPicPr>
-          <p:nvPr/>
-        </p:nvPicPr>
-        <p:blipFill>
-          <a:blip r:embed="rId2"/>
-          <a:stretch>
-            <a:fillRect/>
-          </a:stretch>
-        </p:blipFill>
-        <p:spPr>
-          <a:xfrm>
-            <a:off x="962279" y="1019775"/>
-            <a:ext cx="10195580" cy="5217853"/>
-          </a:xfrm>
-          <a:prstGeom prst="rect">
-            <a:avLst/>
-          </a:prstGeom>
-        </p:spPr>
-      </p:pic>
     </p:spTree>
     <p:extLst>
       <p:ext uri="{BB962C8B-B14F-4D97-AF65-F5344CB8AC3E}">
-        <p14:creationId xmlns:p14="http://schemas.microsoft.com/office/powerpoint/2010/main" val="844914538"/>
+        <p14:creationId xmlns:p14="http://schemas.microsoft.com/office/powerpoint/2010/main" val="1468382734"/>
       </p:ext>
     </p:extLst>
   </p:cSld>
@@ -27933,8 +27997,8 @@
           </a:p>
         </p:txBody>
       </p:sp>
-      <mc:AlternateContent xmlns:mc="http://schemas.openxmlformats.org/markup-compatibility/2006">
-        <mc:Choice xmlns:a14="http://schemas.microsoft.com/office/drawing/2010/main" Requires="a14">
+      <mc:AlternateContent xmlns:mc="http://schemas.openxmlformats.org/markup-compatibility/2006" xmlns:a14="http://schemas.microsoft.com/office/drawing/2010/main">
+        <mc:Choice Requires="a14">
           <p:sp>
             <p:nvSpPr>
               <p:cNvPr id="12" name="Content Placeholder 2">
@@ -29764,7 +29828,7 @@
             </p:txBody>
           </p:sp>
         </mc:Choice>
-        <mc:Fallback>
+        <mc:Fallback xmlns="">
           <p:sp>
             <p:nvSpPr>
               <p:cNvPr id="12" name="Content Placeholder 2">
@@ -31262,7 +31326,7 @@
         </p:spPr>
         <p:txBody>
           <a:bodyPr vert="horz" lIns="91440" tIns="45720" rIns="91440" bIns="45720" rtlCol="0">
-            <a:normAutofit/>
+            <a:normAutofit fontScale="92500" lnSpcReduction="20000"/>
           </a:bodyPr>
           <a:lstStyle>
             <a:lvl1pPr marL="228600" indent="-228600" algn="l" defTabSz="914400" rtl="0" eaLnBrk="1" latinLnBrk="0" hangingPunct="1">
@@ -31525,6 +31589,20 @@
               <a:t>https://eta.impa.br/dl/135.pdf</a:t>
             </a:r>
             <a:endParaRPr lang="de-DE" sz="2400" dirty="0"/>
+          </a:p>
+          <a:p>
+            <a:pPr>
+              <a:lnSpc>
+                <a:spcPct val="120000"/>
+              </a:lnSpc>
+            </a:pPr>
+            <a:r>
+              <a:rPr lang="de-DE" dirty="0">
+                <a:hlinkClick r:id="rId9"/>
+              </a:rPr>
+              <a:t>https://blogs.nvidia.com/blog/2019/11/15/whats-the-difference-between-single-double-multi-and-mixed-precision-computing/</a:t>
+            </a:r>
+            <a:endParaRPr lang="de-DE" dirty="0"/>
           </a:p>
           <a:p>
             <a:pPr>

</xml_diff>